<commit_message>
ml to readme and ppt
</commit_message>
<xml_diff>
--- a/NU-Final_Project_Titanic.pptx
+++ b/NU-Final_Project_Titanic.pptx
@@ -5,20 +5,21 @@
     <p:sldMasterId id="2147483648" r:id="rId1"/>
   </p:sldMasterIdLst>
   <p:notesMasterIdLst>
-    <p:notesMasterId r:id="rId10"/>
+    <p:notesMasterId r:id="rId11"/>
   </p:notesMasterIdLst>
   <p:handoutMasterIdLst>
-    <p:handoutMasterId r:id="rId11"/>
+    <p:handoutMasterId r:id="rId12"/>
   </p:handoutMasterIdLst>
   <p:sldIdLst>
     <p:sldId id="256" r:id="rId2"/>
     <p:sldId id="309" r:id="rId3"/>
     <p:sldId id="330" r:id="rId4"/>
     <p:sldId id="331" r:id="rId5"/>
-    <p:sldId id="329" r:id="rId6"/>
-    <p:sldId id="327" r:id="rId7"/>
-    <p:sldId id="332" r:id="rId8"/>
-    <p:sldId id="328" r:id="rId9"/>
+    <p:sldId id="333" r:id="rId6"/>
+    <p:sldId id="329" r:id="rId7"/>
+    <p:sldId id="327" r:id="rId8"/>
+    <p:sldId id="332" r:id="rId9"/>
+    <p:sldId id="328" r:id="rId10"/>
   </p:sldIdLst>
   <p:sldSz cx="9144000" cy="5143500" type="screen16x9"/>
   <p:notesSz cx="6858000" cy="9144000"/>
@@ -126,6 +127,7 @@
             <p14:sldId id="309"/>
             <p14:sldId id="330"/>
             <p14:sldId id="331"/>
+            <p14:sldId id="333"/>
             <p14:sldId id="329"/>
             <p14:sldId id="327"/>
             <p14:sldId id="332"/>
@@ -234,7 +236,7 @@
           <a:p>
             <a:fld id="{DE6D1952-4C8C-594A-8D47-CC3EBD31CD69}" type="datetimeFigureOut">
               <a:rPr lang="en-US" smtClean="0"/>
-              <a:t>3/6/2021</a:t>
+              <a:t>3/8/2021</a:t>
             </a:fld>
             <a:endParaRPr lang="en-US"/>
           </a:p>
@@ -400,7 +402,7 @@
           <a:p>
             <a:fld id="{5AE82BA9-193E-D440-8A2C-9653656F2AE3}" type="datetimeFigureOut">
               <a:rPr lang="en-US" smtClean="0"/>
-              <a:t>3/6/2021</a:t>
+              <a:t>3/8/2021</a:t>
             </a:fld>
             <a:endParaRPr lang="en-US"/>
           </a:p>
@@ -1031,7 +1033,7 @@
             <a:fld id="{B362BA78-8688-C546-A03A-2A39F84C0B58}" type="datetime1">
               <a:rPr lang="en-US" smtClean="0"/>
               <a:pPr/>
-              <a:t>3/6/2021</a:t>
+              <a:t>3/8/2021</a:t>
             </a:fld>
             <a:endParaRPr lang="en-US"/>
           </a:p>
@@ -1251,7 +1253,7 @@
             <a:fld id="{EF5B9135-15EF-DE46-84CC-16626B0FAF7F}" type="datetime1">
               <a:rPr lang="en-US" smtClean="0"/>
               <a:pPr/>
-              <a:t>3/6/2021</a:t>
+              <a:t>3/8/2021</a:t>
             </a:fld>
             <a:endParaRPr lang="en-US"/>
           </a:p>
@@ -1499,7 +1501,7 @@
           <a:p>
             <a:fld id="{99477ADD-011F-3541-9724-9C7FC92455D5}" type="datetime1">
               <a:rPr lang="en-US" smtClean="0"/>
-              <a:t>3/6/2021</a:t>
+              <a:t>3/8/2021</a:t>
             </a:fld>
             <a:endParaRPr lang="en-US"/>
           </a:p>
@@ -1613,7 +1615,7 @@
             <a:fld id="{D3421027-4EC0-9C48-8CFB-B8A3104CB056}" type="datetime1">
               <a:rPr lang="en-US" smtClean="0"/>
               <a:pPr/>
-              <a:t>3/6/2021</a:t>
+              <a:t>3/8/2021</a:t>
             </a:fld>
             <a:endParaRPr lang="en-US"/>
           </a:p>
@@ -1879,7 +1881,7 @@
           <a:p>
             <a:fld id="{FA5DAB8B-8178-D047-869E-5A62AF236443}" type="datetime1">
               <a:rPr lang="en-US" smtClean="0"/>
-              <a:t>3/6/2021</a:t>
+              <a:t>3/8/2021</a:t>
             </a:fld>
             <a:endParaRPr lang="en-US" dirty="0"/>
           </a:p>
@@ -2093,7 +2095,7 @@
             <a:fld id="{B9AB8213-A564-3C44-8CA0-968996562138}" type="datetime1">
               <a:rPr lang="en-US" smtClean="0"/>
               <a:pPr/>
-              <a:t>3/6/2021</a:t>
+              <a:t>3/8/2021</a:t>
             </a:fld>
             <a:endParaRPr lang="en-US"/>
           </a:p>
@@ -2363,7 +2365,7 @@
             <a:fld id="{0A83DA12-03A5-114A-ABAE-78CD6BB6AC19}" type="datetime1">
               <a:rPr lang="en-US" smtClean="0"/>
               <a:pPr/>
-              <a:t>3/6/2021</a:t>
+              <a:t>3/8/2021</a:t>
             </a:fld>
             <a:endParaRPr lang="en-US"/>
           </a:p>
@@ -2694,7 +2696,7 @@
             <a:fld id="{1FFF386F-14E4-954A-9EC2-E277FFD66D49}" type="datetime1">
               <a:rPr lang="en-US" smtClean="0"/>
               <a:pPr/>
-              <a:t>3/6/2021</a:t>
+              <a:t>3/8/2021</a:t>
             </a:fld>
             <a:endParaRPr lang="en-US"/>
           </a:p>
@@ -3163,7 +3165,7 @@
             <a:fld id="{D8FFCF06-3344-8345-BEA6-DDAEFCC6ECCE}" type="datetime1">
               <a:rPr lang="en-US" smtClean="0"/>
               <a:pPr/>
-              <a:t>3/6/2021</a:t>
+              <a:t>3/8/2021</a:t>
             </a:fld>
             <a:endParaRPr lang="en-US"/>
           </a:p>
@@ -3306,7 +3308,7 @@
             <a:fld id="{84C6D879-35D4-554E-9D6D-93E8130AA922}" type="datetime1">
               <a:rPr lang="en-US" smtClean="0"/>
               <a:pPr/>
-              <a:t>3/6/2021</a:t>
+              <a:t>3/8/2021</a:t>
             </a:fld>
             <a:endParaRPr lang="en-US"/>
           </a:p>
@@ -3615,7 +3617,7 @@
             <a:fld id="{AB182AE3-760A-8E44-AB65-03A533386DFC}" type="datetime1">
               <a:rPr lang="en-US" smtClean="0"/>
               <a:pPr/>
-              <a:t>3/6/2021</a:t>
+              <a:t>3/8/2021</a:t>
             </a:fld>
             <a:endParaRPr lang="en-US"/>
           </a:p>
@@ -3869,7 +3871,7 @@
           <a:p>
             <a:fld id="{D98C176C-065F-124D-AAA4-94F2B7A2EC7C}" type="datetime1">
               <a:rPr lang="en-US" smtClean="0"/>
-              <a:t>3/6/2021</a:t>
+              <a:t>3/8/2021</a:t>
             </a:fld>
             <a:endParaRPr lang="en-US"/>
           </a:p>
@@ -4269,7 +4271,7 @@
         </p:blipFill>
         <p:spPr>
           <a:xfrm>
-            <a:off x="0" y="0"/>
+            <a:off x="-1" y="-1"/>
             <a:ext cx="9144000" cy="5143500"/>
           </a:xfrm>
           <a:prstGeom prst="rect">
@@ -4292,7 +4294,7 @@
         </p:nvSpPr>
         <p:spPr>
           <a:xfrm>
-            <a:off x="1206500" y="1074371"/>
+            <a:off x="1206500" y="537185"/>
             <a:ext cx="7937499" cy="1102519"/>
           </a:xfrm>
         </p:spPr>
@@ -4322,7 +4324,7 @@
         </p:nvSpPr>
         <p:spPr>
           <a:xfrm>
-            <a:off x="1906101" y="2176889"/>
+            <a:off x="1206500" y="1591846"/>
             <a:ext cx="7237900" cy="1314450"/>
           </a:xfrm>
         </p:spPr>
@@ -4361,7 +4363,7 @@
         </p:blipFill>
         <p:spPr>
           <a:xfrm>
-            <a:off x="218537" y="2774297"/>
+            <a:off x="118864" y="2657289"/>
             <a:ext cx="4677928" cy="2369990"/>
           </a:xfrm>
           <a:prstGeom prst="rect">
@@ -4511,7 +4513,7 @@
         </p:nvSpPr>
         <p:spPr>
           <a:xfrm>
-            <a:off x="1482213" y="1663809"/>
+            <a:off x="1482213" y="1099364"/>
             <a:ext cx="6179574" cy="1815882"/>
           </a:xfrm>
           <a:prstGeom prst="rect">
@@ -4661,7 +4663,7 @@
         </p:blipFill>
         <p:spPr>
           <a:xfrm>
-            <a:off x="207258" y="3448050"/>
+            <a:off x="237594" y="2993808"/>
             <a:ext cx="2997849" cy="1695450"/>
           </a:xfrm>
           <a:prstGeom prst="rect">
@@ -4715,7 +4717,12 @@
             <p:ph type="title"/>
           </p:nvPr>
         </p:nvSpPr>
-        <p:spPr/>
+        <p:spPr>
+          <a:xfrm>
+            <a:off x="457200" y="205979"/>
+            <a:ext cx="8229600" cy="857250"/>
+          </a:xfrm>
+        </p:spPr>
         <p:txBody>
           <a:bodyPr/>
           <a:lstStyle/>
@@ -5034,8 +5041,8 @@
         </p:blipFill>
         <p:spPr>
           <a:xfrm>
-            <a:off x="207258" y="3046494"/>
-            <a:ext cx="2845658" cy="1893656"/>
+            <a:off x="457200" y="2968488"/>
+            <a:ext cx="2595716" cy="1727331"/>
           </a:xfrm>
           <a:prstGeom prst="rect">
             <a:avLst/>
@@ -5095,7 +5102,7 @@
           <a:p>
             <a:r>
               <a:rPr lang="en-US" dirty="0"/>
-              <a:t>Question</a:t>
+              <a:t>Predicting Survival</a:t>
             </a:r>
           </a:p>
         </p:txBody>
@@ -5291,8 +5298,8 @@
         </p:blipFill>
         <p:spPr>
           <a:xfrm>
-            <a:off x="5375297" y="2847703"/>
-            <a:ext cx="3768703" cy="1929576"/>
+            <a:off x="5413485" y="2847703"/>
+            <a:ext cx="3523257" cy="1803908"/>
           </a:xfrm>
           <a:prstGeom prst="rect">
             <a:avLst/>
@@ -5339,7 +5346,7 @@
           <p:cNvPr id="2" name="Title 1">
             <a:extLst>
               <a:ext uri="{FF2B5EF4-FFF2-40B4-BE49-F238E27FC236}">
-                <a16:creationId xmlns:a16="http://schemas.microsoft.com/office/drawing/2014/main" id="{F9FD9062-C0E5-4E2A-ADC4-84FBBD74176D}"/>
+                <a16:creationId xmlns:a16="http://schemas.microsoft.com/office/drawing/2014/main" id="{090F9727-AA13-4CB8-A2AE-81CC4D522DFC}"/>
               </a:ext>
             </a:extLst>
           </p:cNvPr>
@@ -5357,7 +5364,84 @@
           <a:p>
             <a:r>
               <a:rPr lang="en-US" dirty="0"/>
-              <a:t>Project Design</a:t>
+              <a:t>Predicting Survival</a:t>
+            </a:r>
+          </a:p>
+        </p:txBody>
+      </p:sp>
+      <p:sp>
+        <p:nvSpPr>
+          <p:cNvPr id="3" name="Content Placeholder 2">
+            <a:extLst>
+              <a:ext uri="{FF2B5EF4-FFF2-40B4-BE49-F238E27FC236}">
+                <a16:creationId xmlns:a16="http://schemas.microsoft.com/office/drawing/2014/main" id="{578AC746-8C6C-44BD-8811-0EBC8F2E9F71}"/>
+              </a:ext>
+            </a:extLst>
+          </p:cNvPr>
+          <p:cNvSpPr>
+            <a:spLocks noGrp="1"/>
+          </p:cNvSpPr>
+          <p:nvPr>
+            <p:ph idx="1"/>
+          </p:nvPr>
+        </p:nvSpPr>
+        <p:spPr/>
+        <p:txBody>
+          <a:bodyPr>
+            <a:normAutofit fontScale="85000" lnSpcReduction="20000"/>
+          </a:bodyPr>
+          <a:lstStyle/>
+          <a:p>
+            <a:r>
+              <a:rPr lang="en-US" dirty="0"/>
+              <a:t>Model Types</a:t>
+            </a:r>
+          </a:p>
+          <a:p>
+            <a:pPr lvl="1"/>
+            <a:r>
+              <a:rPr lang="en-US" dirty="0"/>
+              <a:t>Support Vector Machine</a:t>
+            </a:r>
+          </a:p>
+          <a:p>
+            <a:pPr lvl="1"/>
+            <a:r>
+              <a:rPr lang="en-US" dirty="0"/>
+              <a:t>Logistic Regression</a:t>
+            </a:r>
+          </a:p>
+          <a:p>
+            <a:pPr lvl="1"/>
+            <a:r>
+              <a:rPr lang="en-US" dirty="0"/>
+              <a:t>Neural Network</a:t>
+            </a:r>
+            <a:endParaRPr lang="en-US" baseline="30000" dirty="0"/>
+          </a:p>
+          <a:p>
+            <a:r>
+              <a:rPr lang="en-US" dirty="0"/>
+              <a:t>Split Data</a:t>
+            </a:r>
+          </a:p>
+          <a:p>
+            <a:r>
+              <a:rPr lang="en-US" dirty="0"/>
+              <a:t>Feature Importance</a:t>
+            </a:r>
+          </a:p>
+          <a:p>
+            <a:r>
+              <a:rPr lang="en-US" dirty="0" err="1"/>
+              <a:t>Hypertuning</a:t>
+            </a:r>
+            <a:endParaRPr lang="en-US" dirty="0"/>
+          </a:p>
+          <a:p>
+            <a:r>
+              <a:rPr lang="en-US" dirty="0"/>
+              <a:t>Evaluate</a:t>
             </a:r>
           </a:p>
         </p:txBody>
@@ -5367,7 +5451,7 @@
           <p:cNvPr id="4" name="Slide Number Placeholder 3">
             <a:extLst>
               <a:ext uri="{FF2B5EF4-FFF2-40B4-BE49-F238E27FC236}">
-                <a16:creationId xmlns:a16="http://schemas.microsoft.com/office/drawing/2014/main" id="{14BC72D7-C83E-42DA-856C-3E3C528A75BE}"/>
+                <a16:creationId xmlns:a16="http://schemas.microsoft.com/office/drawing/2014/main" id="{141DD8F5-8EC0-4831-BDAA-3DC08572173C}"/>
               </a:ext>
             </a:extLst>
           </p:cNvPr>
@@ -5392,418 +5476,45 @@
           </a:p>
         </p:txBody>
       </p:sp>
-      <p:sp>
-        <p:nvSpPr>
-          <p:cNvPr id="21" name="Flowchart: Stored Data 20">
+      <p:pic>
+        <p:nvPicPr>
+          <p:cNvPr id="5" name="Picture 4" descr="A picture containing text, receipt&#10;&#10;Description automatically generated">
             <a:extLst>
               <a:ext uri="{FF2B5EF4-FFF2-40B4-BE49-F238E27FC236}">
-                <a16:creationId xmlns:a16="http://schemas.microsoft.com/office/drawing/2014/main" id="{EB043300-AC69-4E58-ADE4-9F79E47296E1}"/>
+                <a16:creationId xmlns:a16="http://schemas.microsoft.com/office/drawing/2014/main" id="{84A7059F-3747-427B-BC40-B3E1ADC1969C}"/>
               </a:ext>
             </a:extLst>
           </p:cNvPr>
-          <p:cNvSpPr/>
+          <p:cNvPicPr>
+            <a:picLocks noChangeAspect="1"/>
+          </p:cNvPicPr>
           <p:nvPr/>
-        </p:nvSpPr>
+        </p:nvPicPr>
+        <p:blipFill>
+          <a:blip r:embed="rId2"/>
+          <a:stretch>
+            <a:fillRect/>
+          </a:stretch>
+        </p:blipFill>
         <p:spPr>
           <a:xfrm>
-            <a:off x="52549" y="2013059"/>
-            <a:ext cx="1597574" cy="532743"/>
-          </a:xfrm>
-          <a:prstGeom prst="flowChartOnlineStorage">
-            <a:avLst/>
-          </a:prstGeom>
-        </p:spPr>
-        <p:style>
-          <a:lnRef idx="1">
-            <a:schemeClr val="accent1"/>
-          </a:lnRef>
-          <a:fillRef idx="3">
-            <a:schemeClr val="accent1"/>
-          </a:fillRef>
-          <a:effectRef idx="2">
-            <a:schemeClr val="accent1"/>
-          </a:effectRef>
-          <a:fontRef idx="minor">
-            <a:schemeClr val="lt1"/>
-          </a:fontRef>
-        </p:style>
-        <p:txBody>
-          <a:bodyPr rtlCol="0" anchor="ctr"/>
-          <a:lstStyle/>
-          <a:p>
-            <a:pPr algn="ctr"/>
-            <a:r>
-              <a:rPr lang="en-US" sz="1200" dirty="0">
-                <a:solidFill>
-                  <a:schemeClr val="tx1"/>
-                </a:solidFill>
-              </a:rPr>
-              <a:t>titanicDataSet.csv</a:t>
-            </a:r>
-          </a:p>
-        </p:txBody>
-      </p:sp>
-      <p:sp>
-        <p:nvSpPr>
-          <p:cNvPr id="22" name="Rectangle 21">
-            <a:extLst>
-              <a:ext uri="{FF2B5EF4-FFF2-40B4-BE49-F238E27FC236}">
-                <a16:creationId xmlns:a16="http://schemas.microsoft.com/office/drawing/2014/main" id="{DCAAC41D-902A-44E0-B723-0EFB618FDD57}"/>
-              </a:ext>
-            </a:extLst>
-          </p:cNvPr>
-          <p:cNvSpPr/>
-          <p:nvPr/>
-        </p:nvSpPr>
-        <p:spPr>
-          <a:xfrm>
-            <a:off x="1671145" y="1198177"/>
-            <a:ext cx="924910" cy="489575"/>
+            <a:off x="4723677" y="2745096"/>
+            <a:ext cx="3523257" cy="1803908"/>
           </a:xfrm>
           <a:prstGeom prst="rect">
             <a:avLst/>
           </a:prstGeom>
+          <a:ln>
+            <a:solidFill>
+              <a:schemeClr val="tx1"/>
+            </a:solidFill>
+          </a:ln>
         </p:spPr>
-        <p:style>
-          <a:lnRef idx="1">
-            <a:schemeClr val="accent1"/>
-          </a:lnRef>
-          <a:fillRef idx="3">
-            <a:schemeClr val="accent1"/>
-          </a:fillRef>
-          <a:effectRef idx="2">
-            <a:schemeClr val="accent1"/>
-          </a:effectRef>
-          <a:fontRef idx="minor">
-            <a:schemeClr val="lt1"/>
-          </a:fontRef>
-        </p:style>
-        <p:txBody>
-          <a:bodyPr rtlCol="0" anchor="ctr"/>
-          <a:lstStyle/>
-          <a:p>
-            <a:pPr algn="ctr"/>
-            <a:r>
-              <a:rPr lang="en-US" sz="1200" dirty="0">
-                <a:solidFill>
-                  <a:sysClr val="windowText" lastClr="000000"/>
-                </a:solidFill>
-              </a:rPr>
-              <a:t>Lat/ Long Data</a:t>
-            </a:r>
-          </a:p>
-        </p:txBody>
-      </p:sp>
-      <p:sp>
-        <p:nvSpPr>
-          <p:cNvPr id="23" name="Flowchart: Manual Operation 22">
-            <a:extLst>
-              <a:ext uri="{FF2B5EF4-FFF2-40B4-BE49-F238E27FC236}">
-                <a16:creationId xmlns:a16="http://schemas.microsoft.com/office/drawing/2014/main" id="{0C1D91FA-8DDA-48F3-84B0-E135B17E8D48}"/>
-              </a:ext>
-            </a:extLst>
-          </p:cNvPr>
-          <p:cNvSpPr/>
-          <p:nvPr/>
-        </p:nvSpPr>
-        <p:spPr>
-          <a:xfrm>
-            <a:off x="2822026" y="1202585"/>
-            <a:ext cx="1219201" cy="489575"/>
-          </a:xfrm>
-          <a:prstGeom prst="flowChartManualOperation">
-            <a:avLst/>
-          </a:prstGeom>
-        </p:spPr>
-        <p:style>
-          <a:lnRef idx="1">
-            <a:schemeClr val="accent1"/>
-          </a:lnRef>
-          <a:fillRef idx="3">
-            <a:schemeClr val="accent1"/>
-          </a:fillRef>
-          <a:effectRef idx="2">
-            <a:schemeClr val="accent1"/>
-          </a:effectRef>
-          <a:fontRef idx="minor">
-            <a:schemeClr val="lt1"/>
-          </a:fontRef>
-        </p:style>
-        <p:txBody>
-          <a:bodyPr rtlCol="0" anchor="ctr"/>
-          <a:lstStyle/>
-          <a:p>
-            <a:pPr algn="ctr"/>
-            <a:r>
-              <a:rPr lang="en-US" sz="1200" dirty="0">
-                <a:solidFill>
-                  <a:schemeClr val="tx1"/>
-                </a:solidFill>
-              </a:rPr>
-              <a:t>Data Cleaning</a:t>
-            </a:r>
-          </a:p>
-        </p:txBody>
-      </p:sp>
-      <p:sp>
-        <p:nvSpPr>
-          <p:cNvPr id="24" name="Flowchart: Data 23">
-            <a:extLst>
-              <a:ext uri="{FF2B5EF4-FFF2-40B4-BE49-F238E27FC236}">
-                <a16:creationId xmlns:a16="http://schemas.microsoft.com/office/drawing/2014/main" id="{0E911B55-89A9-4173-B4C6-83E6843E927B}"/>
-              </a:ext>
-            </a:extLst>
-          </p:cNvPr>
-          <p:cNvSpPr/>
-          <p:nvPr/>
-        </p:nvSpPr>
-        <p:spPr>
-          <a:xfrm>
-            <a:off x="4041227" y="1229288"/>
-            <a:ext cx="1786761" cy="489574"/>
-          </a:xfrm>
-          <a:prstGeom prst="flowChartInputOutput">
-            <a:avLst/>
-          </a:prstGeom>
-        </p:spPr>
-        <p:style>
-          <a:lnRef idx="1">
-            <a:schemeClr val="accent1"/>
-          </a:lnRef>
-          <a:fillRef idx="3">
-            <a:schemeClr val="accent1"/>
-          </a:fillRef>
-          <a:effectRef idx="2">
-            <a:schemeClr val="accent1"/>
-          </a:effectRef>
-          <a:fontRef idx="minor">
-            <a:schemeClr val="lt1"/>
-          </a:fontRef>
-        </p:style>
-        <p:txBody>
-          <a:bodyPr rtlCol="0" anchor="ctr"/>
-          <a:lstStyle/>
-          <a:p>
-            <a:pPr algn="ctr"/>
-            <a:r>
-              <a:rPr lang="en-US" sz="1200" dirty="0">
-                <a:solidFill>
-                  <a:schemeClr val="tx1"/>
-                </a:solidFill>
-              </a:rPr>
-              <a:t>titanicDataSet_LatLong.csv</a:t>
-            </a:r>
-          </a:p>
-        </p:txBody>
-      </p:sp>
-      <p:sp>
-        <p:nvSpPr>
-          <p:cNvPr id="27" name="Rectangle 26">
-            <a:extLst>
-              <a:ext uri="{FF2B5EF4-FFF2-40B4-BE49-F238E27FC236}">
-                <a16:creationId xmlns:a16="http://schemas.microsoft.com/office/drawing/2014/main" id="{8D2FF620-8445-4235-B127-653BFF038191}"/>
-              </a:ext>
-            </a:extLst>
-          </p:cNvPr>
-          <p:cNvSpPr/>
-          <p:nvPr/>
-        </p:nvSpPr>
-        <p:spPr>
-          <a:xfrm>
-            <a:off x="1650123" y="3006057"/>
-            <a:ext cx="924910" cy="489575"/>
-          </a:xfrm>
-          <a:prstGeom prst="rect">
-            <a:avLst/>
-          </a:prstGeom>
-        </p:spPr>
-        <p:style>
-          <a:lnRef idx="1">
-            <a:schemeClr val="accent1"/>
-          </a:lnRef>
-          <a:fillRef idx="3">
-            <a:schemeClr val="accent1"/>
-          </a:fillRef>
-          <a:effectRef idx="2">
-            <a:schemeClr val="accent1"/>
-          </a:effectRef>
-          <a:fontRef idx="minor">
-            <a:schemeClr val="lt1"/>
-          </a:fontRef>
-        </p:style>
-        <p:txBody>
-          <a:bodyPr rtlCol="0" anchor="ctr"/>
-          <a:lstStyle/>
-          <a:p>
-            <a:pPr algn="ctr"/>
-            <a:r>
-              <a:rPr lang="en-US" sz="1200" dirty="0">
-                <a:solidFill>
-                  <a:sysClr val="windowText" lastClr="000000"/>
-                </a:solidFill>
-              </a:rPr>
-              <a:t>Machine Learning</a:t>
-            </a:r>
-          </a:p>
-        </p:txBody>
-      </p:sp>
-      <p:sp>
-        <p:nvSpPr>
-          <p:cNvPr id="25" name="Flowchart: Display 24">
-            <a:extLst>
-              <a:ext uri="{FF2B5EF4-FFF2-40B4-BE49-F238E27FC236}">
-                <a16:creationId xmlns:a16="http://schemas.microsoft.com/office/drawing/2014/main" id="{2319F5DD-2F62-4223-B607-3841C11EF053}"/>
-              </a:ext>
-            </a:extLst>
-          </p:cNvPr>
-          <p:cNvSpPr/>
-          <p:nvPr/>
-        </p:nvSpPr>
-        <p:spPr>
-          <a:xfrm>
-            <a:off x="7505755" y="2545802"/>
-            <a:ext cx="1513490" cy="756745"/>
-          </a:xfrm>
-          <a:prstGeom prst="flowChartDisplay">
-            <a:avLst/>
-          </a:prstGeom>
-        </p:spPr>
-        <p:style>
-          <a:lnRef idx="1">
-            <a:schemeClr val="accent1"/>
-          </a:lnRef>
-          <a:fillRef idx="3">
-            <a:schemeClr val="accent1"/>
-          </a:fillRef>
-          <a:effectRef idx="2">
-            <a:schemeClr val="accent1"/>
-          </a:effectRef>
-          <a:fontRef idx="minor">
-            <a:schemeClr val="lt1"/>
-          </a:fontRef>
-        </p:style>
-        <p:txBody>
-          <a:bodyPr rtlCol="0" anchor="ctr"/>
-          <a:lstStyle/>
-          <a:p>
-            <a:pPr algn="ctr"/>
-            <a:r>
-              <a:rPr lang="en-US" sz="1600" dirty="0">
-                <a:solidFill>
-                  <a:sysClr val="windowText" lastClr="000000"/>
-                </a:solidFill>
-              </a:rPr>
-              <a:t>Webpage</a:t>
-            </a:r>
-          </a:p>
-        </p:txBody>
-      </p:sp>
-      <p:sp>
-        <p:nvSpPr>
-          <p:cNvPr id="29" name="Rectangle 28">
-            <a:extLst>
-              <a:ext uri="{FF2B5EF4-FFF2-40B4-BE49-F238E27FC236}">
-                <a16:creationId xmlns:a16="http://schemas.microsoft.com/office/drawing/2014/main" id="{94EF39FF-2023-42CC-8ADC-59A1047C3E00}"/>
-              </a:ext>
-            </a:extLst>
-          </p:cNvPr>
-          <p:cNvSpPr/>
-          <p:nvPr/>
-        </p:nvSpPr>
-        <p:spPr>
-          <a:xfrm>
-            <a:off x="6122278" y="1237355"/>
-            <a:ext cx="1014245" cy="489575"/>
-          </a:xfrm>
-          <a:prstGeom prst="rect">
-            <a:avLst/>
-          </a:prstGeom>
-        </p:spPr>
-        <p:style>
-          <a:lnRef idx="1">
-            <a:schemeClr val="accent1"/>
-          </a:lnRef>
-          <a:fillRef idx="3">
-            <a:schemeClr val="accent1"/>
-          </a:fillRef>
-          <a:effectRef idx="2">
-            <a:schemeClr val="accent1"/>
-          </a:effectRef>
-          <a:fontRef idx="minor">
-            <a:schemeClr val="lt1"/>
-          </a:fontRef>
-        </p:style>
-        <p:txBody>
-          <a:bodyPr rtlCol="0" anchor="ctr"/>
-          <a:lstStyle/>
-          <a:p>
-            <a:pPr algn="ctr"/>
-            <a:r>
-              <a:rPr lang="en-US" sz="1200" dirty="0">
-                <a:solidFill>
-                  <a:sysClr val="windowText" lastClr="000000"/>
-                </a:solidFill>
-              </a:rPr>
-              <a:t>Data Visualization</a:t>
-            </a:r>
-          </a:p>
-        </p:txBody>
-      </p:sp>
-      <p:sp>
-        <p:nvSpPr>
-          <p:cNvPr id="30" name="Rectangle 29">
-            <a:extLst>
-              <a:ext uri="{FF2B5EF4-FFF2-40B4-BE49-F238E27FC236}">
-                <a16:creationId xmlns:a16="http://schemas.microsoft.com/office/drawing/2014/main" id="{93CE43D7-4B1A-4790-8E8E-9DD2C05931AD}"/>
-              </a:ext>
-            </a:extLst>
-          </p:cNvPr>
-          <p:cNvSpPr/>
-          <p:nvPr/>
-        </p:nvSpPr>
-        <p:spPr>
-          <a:xfrm>
-            <a:off x="6122278" y="2654001"/>
-            <a:ext cx="1014245" cy="489575"/>
-          </a:xfrm>
-          <a:prstGeom prst="rect">
-            <a:avLst/>
-          </a:prstGeom>
-        </p:spPr>
-        <p:style>
-          <a:lnRef idx="1">
-            <a:schemeClr val="accent1"/>
-          </a:lnRef>
-          <a:fillRef idx="3">
-            <a:schemeClr val="accent1"/>
-          </a:fillRef>
-          <a:effectRef idx="2">
-            <a:schemeClr val="accent1"/>
-          </a:effectRef>
-          <a:fontRef idx="minor">
-            <a:schemeClr val="lt1"/>
-          </a:fontRef>
-        </p:style>
-        <p:txBody>
-          <a:bodyPr rtlCol="0" anchor="ctr"/>
-          <a:lstStyle/>
-          <a:p>
-            <a:pPr algn="ctr"/>
-            <a:r>
-              <a:rPr lang="en-US" sz="1200" dirty="0">
-                <a:solidFill>
-                  <a:sysClr val="windowText" lastClr="000000"/>
-                </a:solidFill>
-              </a:rPr>
-              <a:t>Webpage</a:t>
-            </a:r>
-          </a:p>
-        </p:txBody>
-      </p:sp>
+      </p:pic>
     </p:spTree>
     <p:extLst>
       <p:ext uri="{BB962C8B-B14F-4D97-AF65-F5344CB8AC3E}">
-        <p14:creationId xmlns:p14="http://schemas.microsoft.com/office/powerpoint/2010/main" val="2344643183"/>
+        <p14:creationId xmlns:p14="http://schemas.microsoft.com/office/powerpoint/2010/main" val="592929305"/>
       </p:ext>
     </p:extLst>
   </p:cSld>
@@ -5835,7 +5546,7 @@
           <p:cNvPr id="2" name="Title 1">
             <a:extLst>
               <a:ext uri="{FF2B5EF4-FFF2-40B4-BE49-F238E27FC236}">
-                <a16:creationId xmlns:a16="http://schemas.microsoft.com/office/drawing/2014/main" id="{A04E2D93-9DE6-4CD8-8D40-EA6EF0F7A4E0}"/>
+                <a16:creationId xmlns:a16="http://schemas.microsoft.com/office/drawing/2014/main" id="{F9FD9062-C0E5-4E2A-ADC4-84FBBD74176D}"/>
               </a:ext>
             </a:extLst>
           </p:cNvPr>
@@ -5846,97 +5557,24 @@
             <p:ph type="title"/>
           </p:nvPr>
         </p:nvSpPr>
-        <p:spPr>
-          <a:xfrm>
-            <a:off x="457200" y="234158"/>
-            <a:ext cx="8229600" cy="857250"/>
-          </a:xfrm>
-        </p:spPr>
+        <p:spPr/>
         <p:txBody>
           <a:bodyPr/>
           <a:lstStyle/>
           <a:p>
             <a:r>
               <a:rPr lang="en-US" dirty="0"/>
-              <a:t>Project Challenges</a:t>
-            </a:r>
-          </a:p>
-        </p:txBody>
-      </p:sp>
-      <p:sp>
-        <p:nvSpPr>
-          <p:cNvPr id="4" name="Content Placeholder 3">
+              <a:t>Project Design</a:t>
+            </a:r>
+          </a:p>
+        </p:txBody>
+      </p:sp>
+      <p:sp>
+        <p:nvSpPr>
+          <p:cNvPr id="4" name="Slide Number Placeholder 3">
             <a:extLst>
               <a:ext uri="{FF2B5EF4-FFF2-40B4-BE49-F238E27FC236}">
-                <a16:creationId xmlns:a16="http://schemas.microsoft.com/office/drawing/2014/main" id="{53F845B0-B0F9-4FF0-8303-447A59111C3C}"/>
-              </a:ext>
-            </a:extLst>
-          </p:cNvPr>
-          <p:cNvSpPr>
-            <a:spLocks noGrp="1"/>
-          </p:cNvSpPr>
-          <p:nvPr>
-            <p:ph sz="half" idx="2"/>
-          </p:nvPr>
-        </p:nvSpPr>
-        <p:spPr>
-          <a:xfrm>
-            <a:off x="457200" y="1297858"/>
-            <a:ext cx="8479542" cy="3296764"/>
-          </a:xfrm>
-        </p:spPr>
-        <p:txBody>
-          <a:bodyPr>
-            <a:normAutofit/>
-          </a:bodyPr>
-          <a:lstStyle/>
-          <a:p>
-            <a:r>
-              <a:rPr lang="en-US" sz="1800" b="1" dirty="0"/>
-              <a:t>Data Cleaning</a:t>
-            </a:r>
-          </a:p>
-          <a:p>
-            <a:pPr marL="0" indent="0">
-              <a:buNone/>
-            </a:pPr>
-            <a:endParaRPr lang="en-US" sz="1600" dirty="0"/>
-          </a:p>
-          <a:p>
-            <a:pPr lvl="1"/>
-            <a:r>
-              <a:rPr lang="en-US" sz="1400" dirty="0"/>
-              <a:t>Spelling: Names and Ages inconsistently recorded between different data sets – Manual Scrub</a:t>
-            </a:r>
-          </a:p>
-          <a:p>
-            <a:pPr lvl="1"/>
-            <a:r>
-              <a:rPr lang="en-US" sz="1400" dirty="0"/>
-              <a:t>Missing Data - Cross referenced multiple datasets to fill in gaps</a:t>
-            </a:r>
-          </a:p>
-          <a:p>
-            <a:pPr lvl="1"/>
-            <a:r>
-              <a:rPr lang="en-US" sz="1400" dirty="0"/>
-              <a:t>Hometowns not on the map - Used Google Places API to pull Lat/Long</a:t>
-            </a:r>
-          </a:p>
-          <a:p>
-            <a:pPr marL="457200" lvl="1" indent="0">
-              <a:buNone/>
-            </a:pPr>
-            <a:endParaRPr lang="en-US" sz="1400" dirty="0"/>
-          </a:p>
-        </p:txBody>
-      </p:sp>
-      <p:sp>
-        <p:nvSpPr>
-          <p:cNvPr id="7" name="Slide Number Placeholder 6">
-            <a:extLst>
-              <a:ext uri="{FF2B5EF4-FFF2-40B4-BE49-F238E27FC236}">
-                <a16:creationId xmlns:a16="http://schemas.microsoft.com/office/drawing/2014/main" id="{E9594AAB-C2C0-4679-9596-6C426FAB27A2}"/>
+                <a16:creationId xmlns:a16="http://schemas.microsoft.com/office/drawing/2014/main" id="{14BC72D7-C83E-42DA-856C-3E3C528A75BE}"/>
               </a:ext>
             </a:extLst>
           </p:cNvPr>
@@ -5961,10 +5599,418 @@
           </a:p>
         </p:txBody>
       </p:sp>
+      <p:sp>
+        <p:nvSpPr>
+          <p:cNvPr id="21" name="Flowchart: Stored Data 20">
+            <a:extLst>
+              <a:ext uri="{FF2B5EF4-FFF2-40B4-BE49-F238E27FC236}">
+                <a16:creationId xmlns:a16="http://schemas.microsoft.com/office/drawing/2014/main" id="{EB043300-AC69-4E58-ADE4-9F79E47296E1}"/>
+              </a:ext>
+            </a:extLst>
+          </p:cNvPr>
+          <p:cNvSpPr/>
+          <p:nvPr/>
+        </p:nvSpPr>
+        <p:spPr>
+          <a:xfrm>
+            <a:off x="52549" y="2013059"/>
+            <a:ext cx="1597574" cy="532743"/>
+          </a:xfrm>
+          <a:prstGeom prst="flowChartOnlineStorage">
+            <a:avLst/>
+          </a:prstGeom>
+        </p:spPr>
+        <p:style>
+          <a:lnRef idx="1">
+            <a:schemeClr val="accent1"/>
+          </a:lnRef>
+          <a:fillRef idx="3">
+            <a:schemeClr val="accent1"/>
+          </a:fillRef>
+          <a:effectRef idx="2">
+            <a:schemeClr val="accent1"/>
+          </a:effectRef>
+          <a:fontRef idx="minor">
+            <a:schemeClr val="lt1"/>
+          </a:fontRef>
+        </p:style>
+        <p:txBody>
+          <a:bodyPr rtlCol="0" anchor="ctr"/>
+          <a:lstStyle/>
+          <a:p>
+            <a:pPr algn="ctr"/>
+            <a:r>
+              <a:rPr lang="en-US" sz="1200" dirty="0">
+                <a:solidFill>
+                  <a:schemeClr val="tx1"/>
+                </a:solidFill>
+              </a:rPr>
+              <a:t>titanicDataSet.csv</a:t>
+            </a:r>
+          </a:p>
+        </p:txBody>
+      </p:sp>
+      <p:sp>
+        <p:nvSpPr>
+          <p:cNvPr id="22" name="Rectangle 21">
+            <a:extLst>
+              <a:ext uri="{FF2B5EF4-FFF2-40B4-BE49-F238E27FC236}">
+                <a16:creationId xmlns:a16="http://schemas.microsoft.com/office/drawing/2014/main" id="{DCAAC41D-902A-44E0-B723-0EFB618FDD57}"/>
+              </a:ext>
+            </a:extLst>
+          </p:cNvPr>
+          <p:cNvSpPr/>
+          <p:nvPr/>
+        </p:nvSpPr>
+        <p:spPr>
+          <a:xfrm>
+            <a:off x="1671145" y="1198177"/>
+            <a:ext cx="924910" cy="489575"/>
+          </a:xfrm>
+          <a:prstGeom prst="rect">
+            <a:avLst/>
+          </a:prstGeom>
+        </p:spPr>
+        <p:style>
+          <a:lnRef idx="1">
+            <a:schemeClr val="accent1"/>
+          </a:lnRef>
+          <a:fillRef idx="3">
+            <a:schemeClr val="accent1"/>
+          </a:fillRef>
+          <a:effectRef idx="2">
+            <a:schemeClr val="accent1"/>
+          </a:effectRef>
+          <a:fontRef idx="minor">
+            <a:schemeClr val="lt1"/>
+          </a:fontRef>
+        </p:style>
+        <p:txBody>
+          <a:bodyPr rtlCol="0" anchor="ctr"/>
+          <a:lstStyle/>
+          <a:p>
+            <a:pPr algn="ctr"/>
+            <a:r>
+              <a:rPr lang="en-US" sz="1200" dirty="0">
+                <a:solidFill>
+                  <a:sysClr val="windowText" lastClr="000000"/>
+                </a:solidFill>
+              </a:rPr>
+              <a:t>Lat/ Long Data</a:t>
+            </a:r>
+          </a:p>
+        </p:txBody>
+      </p:sp>
+      <p:sp>
+        <p:nvSpPr>
+          <p:cNvPr id="23" name="Flowchart: Manual Operation 22">
+            <a:extLst>
+              <a:ext uri="{FF2B5EF4-FFF2-40B4-BE49-F238E27FC236}">
+                <a16:creationId xmlns:a16="http://schemas.microsoft.com/office/drawing/2014/main" id="{0C1D91FA-8DDA-48F3-84B0-E135B17E8D48}"/>
+              </a:ext>
+            </a:extLst>
+          </p:cNvPr>
+          <p:cNvSpPr/>
+          <p:nvPr/>
+        </p:nvSpPr>
+        <p:spPr>
+          <a:xfrm>
+            <a:off x="2822026" y="1202585"/>
+            <a:ext cx="1219201" cy="489575"/>
+          </a:xfrm>
+          <a:prstGeom prst="flowChartManualOperation">
+            <a:avLst/>
+          </a:prstGeom>
+        </p:spPr>
+        <p:style>
+          <a:lnRef idx="1">
+            <a:schemeClr val="accent1"/>
+          </a:lnRef>
+          <a:fillRef idx="3">
+            <a:schemeClr val="accent1"/>
+          </a:fillRef>
+          <a:effectRef idx="2">
+            <a:schemeClr val="accent1"/>
+          </a:effectRef>
+          <a:fontRef idx="minor">
+            <a:schemeClr val="lt1"/>
+          </a:fontRef>
+        </p:style>
+        <p:txBody>
+          <a:bodyPr rtlCol="0" anchor="ctr"/>
+          <a:lstStyle/>
+          <a:p>
+            <a:pPr algn="ctr"/>
+            <a:r>
+              <a:rPr lang="en-US" sz="1200" dirty="0">
+                <a:solidFill>
+                  <a:schemeClr val="tx1"/>
+                </a:solidFill>
+              </a:rPr>
+              <a:t>Data Cleaning</a:t>
+            </a:r>
+          </a:p>
+        </p:txBody>
+      </p:sp>
+      <p:sp>
+        <p:nvSpPr>
+          <p:cNvPr id="24" name="Flowchart: Data 23">
+            <a:extLst>
+              <a:ext uri="{FF2B5EF4-FFF2-40B4-BE49-F238E27FC236}">
+                <a16:creationId xmlns:a16="http://schemas.microsoft.com/office/drawing/2014/main" id="{0E911B55-89A9-4173-B4C6-83E6843E927B}"/>
+              </a:ext>
+            </a:extLst>
+          </p:cNvPr>
+          <p:cNvSpPr/>
+          <p:nvPr/>
+        </p:nvSpPr>
+        <p:spPr>
+          <a:xfrm>
+            <a:off x="4041227" y="1229288"/>
+            <a:ext cx="1786761" cy="489574"/>
+          </a:xfrm>
+          <a:prstGeom prst="flowChartInputOutput">
+            <a:avLst/>
+          </a:prstGeom>
+        </p:spPr>
+        <p:style>
+          <a:lnRef idx="1">
+            <a:schemeClr val="accent1"/>
+          </a:lnRef>
+          <a:fillRef idx="3">
+            <a:schemeClr val="accent1"/>
+          </a:fillRef>
+          <a:effectRef idx="2">
+            <a:schemeClr val="accent1"/>
+          </a:effectRef>
+          <a:fontRef idx="minor">
+            <a:schemeClr val="lt1"/>
+          </a:fontRef>
+        </p:style>
+        <p:txBody>
+          <a:bodyPr rtlCol="0" anchor="ctr"/>
+          <a:lstStyle/>
+          <a:p>
+            <a:pPr algn="ctr"/>
+            <a:r>
+              <a:rPr lang="en-US" sz="1200" dirty="0">
+                <a:solidFill>
+                  <a:schemeClr val="tx1"/>
+                </a:solidFill>
+              </a:rPr>
+              <a:t>titanicDataSet_LatLong.csv</a:t>
+            </a:r>
+          </a:p>
+        </p:txBody>
+      </p:sp>
+      <p:sp>
+        <p:nvSpPr>
+          <p:cNvPr id="27" name="Rectangle 26">
+            <a:extLst>
+              <a:ext uri="{FF2B5EF4-FFF2-40B4-BE49-F238E27FC236}">
+                <a16:creationId xmlns:a16="http://schemas.microsoft.com/office/drawing/2014/main" id="{8D2FF620-8445-4235-B127-653BFF038191}"/>
+              </a:ext>
+            </a:extLst>
+          </p:cNvPr>
+          <p:cNvSpPr/>
+          <p:nvPr/>
+        </p:nvSpPr>
+        <p:spPr>
+          <a:xfrm>
+            <a:off x="1650123" y="3006057"/>
+            <a:ext cx="924910" cy="489575"/>
+          </a:xfrm>
+          <a:prstGeom prst="rect">
+            <a:avLst/>
+          </a:prstGeom>
+        </p:spPr>
+        <p:style>
+          <a:lnRef idx="1">
+            <a:schemeClr val="accent1"/>
+          </a:lnRef>
+          <a:fillRef idx="3">
+            <a:schemeClr val="accent1"/>
+          </a:fillRef>
+          <a:effectRef idx="2">
+            <a:schemeClr val="accent1"/>
+          </a:effectRef>
+          <a:fontRef idx="minor">
+            <a:schemeClr val="lt1"/>
+          </a:fontRef>
+        </p:style>
+        <p:txBody>
+          <a:bodyPr rtlCol="0" anchor="ctr"/>
+          <a:lstStyle/>
+          <a:p>
+            <a:pPr algn="ctr"/>
+            <a:r>
+              <a:rPr lang="en-US" sz="1200" dirty="0">
+                <a:solidFill>
+                  <a:sysClr val="windowText" lastClr="000000"/>
+                </a:solidFill>
+              </a:rPr>
+              <a:t>Machine Learning</a:t>
+            </a:r>
+          </a:p>
+        </p:txBody>
+      </p:sp>
+      <p:sp>
+        <p:nvSpPr>
+          <p:cNvPr id="25" name="Flowchart: Display 24">
+            <a:extLst>
+              <a:ext uri="{FF2B5EF4-FFF2-40B4-BE49-F238E27FC236}">
+                <a16:creationId xmlns:a16="http://schemas.microsoft.com/office/drawing/2014/main" id="{2319F5DD-2F62-4223-B607-3841C11EF053}"/>
+              </a:ext>
+            </a:extLst>
+          </p:cNvPr>
+          <p:cNvSpPr/>
+          <p:nvPr/>
+        </p:nvSpPr>
+        <p:spPr>
+          <a:xfrm>
+            <a:off x="7505755" y="2545802"/>
+            <a:ext cx="1513490" cy="756745"/>
+          </a:xfrm>
+          <a:prstGeom prst="flowChartDisplay">
+            <a:avLst/>
+          </a:prstGeom>
+        </p:spPr>
+        <p:style>
+          <a:lnRef idx="1">
+            <a:schemeClr val="accent1"/>
+          </a:lnRef>
+          <a:fillRef idx="3">
+            <a:schemeClr val="accent1"/>
+          </a:fillRef>
+          <a:effectRef idx="2">
+            <a:schemeClr val="accent1"/>
+          </a:effectRef>
+          <a:fontRef idx="minor">
+            <a:schemeClr val="lt1"/>
+          </a:fontRef>
+        </p:style>
+        <p:txBody>
+          <a:bodyPr rtlCol="0" anchor="ctr"/>
+          <a:lstStyle/>
+          <a:p>
+            <a:pPr algn="ctr"/>
+            <a:r>
+              <a:rPr lang="en-US" sz="1600" dirty="0">
+                <a:solidFill>
+                  <a:sysClr val="windowText" lastClr="000000"/>
+                </a:solidFill>
+              </a:rPr>
+              <a:t>Webpage</a:t>
+            </a:r>
+          </a:p>
+        </p:txBody>
+      </p:sp>
+      <p:sp>
+        <p:nvSpPr>
+          <p:cNvPr id="29" name="Rectangle 28">
+            <a:extLst>
+              <a:ext uri="{FF2B5EF4-FFF2-40B4-BE49-F238E27FC236}">
+                <a16:creationId xmlns:a16="http://schemas.microsoft.com/office/drawing/2014/main" id="{94EF39FF-2023-42CC-8ADC-59A1047C3E00}"/>
+              </a:ext>
+            </a:extLst>
+          </p:cNvPr>
+          <p:cNvSpPr/>
+          <p:nvPr/>
+        </p:nvSpPr>
+        <p:spPr>
+          <a:xfrm>
+            <a:off x="6122278" y="1237355"/>
+            <a:ext cx="1014245" cy="489575"/>
+          </a:xfrm>
+          <a:prstGeom prst="rect">
+            <a:avLst/>
+          </a:prstGeom>
+        </p:spPr>
+        <p:style>
+          <a:lnRef idx="1">
+            <a:schemeClr val="accent1"/>
+          </a:lnRef>
+          <a:fillRef idx="3">
+            <a:schemeClr val="accent1"/>
+          </a:fillRef>
+          <a:effectRef idx="2">
+            <a:schemeClr val="accent1"/>
+          </a:effectRef>
+          <a:fontRef idx="minor">
+            <a:schemeClr val="lt1"/>
+          </a:fontRef>
+        </p:style>
+        <p:txBody>
+          <a:bodyPr rtlCol="0" anchor="ctr"/>
+          <a:lstStyle/>
+          <a:p>
+            <a:pPr algn="ctr"/>
+            <a:r>
+              <a:rPr lang="en-US" sz="1200" dirty="0">
+                <a:solidFill>
+                  <a:sysClr val="windowText" lastClr="000000"/>
+                </a:solidFill>
+              </a:rPr>
+              <a:t>Data Visualization</a:t>
+            </a:r>
+          </a:p>
+        </p:txBody>
+      </p:sp>
+      <p:sp>
+        <p:nvSpPr>
+          <p:cNvPr id="30" name="Rectangle 29">
+            <a:extLst>
+              <a:ext uri="{FF2B5EF4-FFF2-40B4-BE49-F238E27FC236}">
+                <a16:creationId xmlns:a16="http://schemas.microsoft.com/office/drawing/2014/main" id="{93CE43D7-4B1A-4790-8E8E-9DD2C05931AD}"/>
+              </a:ext>
+            </a:extLst>
+          </p:cNvPr>
+          <p:cNvSpPr/>
+          <p:nvPr/>
+        </p:nvSpPr>
+        <p:spPr>
+          <a:xfrm>
+            <a:off x="6122278" y="2654001"/>
+            <a:ext cx="1014245" cy="489575"/>
+          </a:xfrm>
+          <a:prstGeom prst="rect">
+            <a:avLst/>
+          </a:prstGeom>
+        </p:spPr>
+        <p:style>
+          <a:lnRef idx="1">
+            <a:schemeClr val="accent1"/>
+          </a:lnRef>
+          <a:fillRef idx="3">
+            <a:schemeClr val="accent1"/>
+          </a:fillRef>
+          <a:effectRef idx="2">
+            <a:schemeClr val="accent1"/>
+          </a:effectRef>
+          <a:fontRef idx="minor">
+            <a:schemeClr val="lt1"/>
+          </a:fontRef>
+        </p:style>
+        <p:txBody>
+          <a:bodyPr rtlCol="0" anchor="ctr"/>
+          <a:lstStyle/>
+          <a:p>
+            <a:pPr algn="ctr"/>
+            <a:r>
+              <a:rPr lang="en-US" sz="1200" dirty="0">
+                <a:solidFill>
+                  <a:sysClr val="windowText" lastClr="000000"/>
+                </a:solidFill>
+              </a:rPr>
+              <a:t>Webpage</a:t>
+            </a:r>
+          </a:p>
+        </p:txBody>
+      </p:sp>
     </p:spTree>
     <p:extLst>
       <p:ext uri="{BB962C8B-B14F-4D97-AF65-F5344CB8AC3E}">
-        <p14:creationId xmlns:p14="http://schemas.microsoft.com/office/powerpoint/2010/main" val="2196988662"/>
+        <p14:creationId xmlns:p14="http://schemas.microsoft.com/office/powerpoint/2010/main" val="2344643183"/>
       </p:ext>
     </p:extLst>
   </p:cSld>
@@ -5996,6 +6042,167 @@
           <p:cNvPr id="2" name="Title 1">
             <a:extLst>
               <a:ext uri="{FF2B5EF4-FFF2-40B4-BE49-F238E27FC236}">
+                <a16:creationId xmlns:a16="http://schemas.microsoft.com/office/drawing/2014/main" id="{A04E2D93-9DE6-4CD8-8D40-EA6EF0F7A4E0}"/>
+              </a:ext>
+            </a:extLst>
+          </p:cNvPr>
+          <p:cNvSpPr>
+            <a:spLocks noGrp="1"/>
+          </p:cNvSpPr>
+          <p:nvPr>
+            <p:ph type="title"/>
+          </p:nvPr>
+        </p:nvSpPr>
+        <p:spPr>
+          <a:xfrm>
+            <a:off x="457200" y="234158"/>
+            <a:ext cx="8229600" cy="857250"/>
+          </a:xfrm>
+        </p:spPr>
+        <p:txBody>
+          <a:bodyPr/>
+          <a:lstStyle/>
+          <a:p>
+            <a:r>
+              <a:rPr lang="en-US" dirty="0"/>
+              <a:t>Project Challenges</a:t>
+            </a:r>
+          </a:p>
+        </p:txBody>
+      </p:sp>
+      <p:sp>
+        <p:nvSpPr>
+          <p:cNvPr id="4" name="Content Placeholder 3">
+            <a:extLst>
+              <a:ext uri="{FF2B5EF4-FFF2-40B4-BE49-F238E27FC236}">
+                <a16:creationId xmlns:a16="http://schemas.microsoft.com/office/drawing/2014/main" id="{53F845B0-B0F9-4FF0-8303-447A59111C3C}"/>
+              </a:ext>
+            </a:extLst>
+          </p:cNvPr>
+          <p:cNvSpPr>
+            <a:spLocks noGrp="1"/>
+          </p:cNvSpPr>
+          <p:nvPr>
+            <p:ph sz="half" idx="2"/>
+          </p:nvPr>
+        </p:nvSpPr>
+        <p:spPr>
+          <a:xfrm>
+            <a:off x="457200" y="1297858"/>
+            <a:ext cx="8479542" cy="3296764"/>
+          </a:xfrm>
+        </p:spPr>
+        <p:txBody>
+          <a:bodyPr>
+            <a:normAutofit/>
+          </a:bodyPr>
+          <a:lstStyle/>
+          <a:p>
+            <a:r>
+              <a:rPr lang="en-US" sz="1800" b="1" dirty="0"/>
+              <a:t>Data Cleaning</a:t>
+            </a:r>
+          </a:p>
+          <a:p>
+            <a:pPr marL="0" indent="0">
+              <a:buNone/>
+            </a:pPr>
+            <a:endParaRPr lang="en-US" sz="1600" dirty="0"/>
+          </a:p>
+          <a:p>
+            <a:pPr lvl="1"/>
+            <a:r>
+              <a:rPr lang="en-US" sz="1400" dirty="0"/>
+              <a:t>Spelling: Names and Ages inconsistently recorded between different data sets – Manual Scrub</a:t>
+            </a:r>
+          </a:p>
+          <a:p>
+            <a:pPr lvl="1"/>
+            <a:r>
+              <a:rPr lang="en-US" sz="1400" dirty="0"/>
+              <a:t>Missing Data - Cross referenced multiple datasets to fill in gaps</a:t>
+            </a:r>
+          </a:p>
+          <a:p>
+            <a:pPr lvl="1"/>
+            <a:r>
+              <a:rPr lang="en-US" sz="1400" dirty="0"/>
+              <a:t>Hometowns not on the map - Used Google Places API to pull Lat/Long</a:t>
+            </a:r>
+          </a:p>
+          <a:p>
+            <a:pPr marL="457200" lvl="1" indent="0">
+              <a:buNone/>
+            </a:pPr>
+            <a:endParaRPr lang="en-US" sz="1400" dirty="0"/>
+          </a:p>
+        </p:txBody>
+      </p:sp>
+      <p:sp>
+        <p:nvSpPr>
+          <p:cNvPr id="7" name="Slide Number Placeholder 6">
+            <a:extLst>
+              <a:ext uri="{FF2B5EF4-FFF2-40B4-BE49-F238E27FC236}">
+                <a16:creationId xmlns:a16="http://schemas.microsoft.com/office/drawing/2014/main" id="{E9594AAB-C2C0-4679-9596-6C426FAB27A2}"/>
+              </a:ext>
+            </a:extLst>
+          </p:cNvPr>
+          <p:cNvSpPr>
+            <a:spLocks noGrp="1"/>
+          </p:cNvSpPr>
+          <p:nvPr>
+            <p:ph type="sldNum" sz="quarter" idx="12"/>
+          </p:nvPr>
+        </p:nvSpPr>
+        <p:spPr/>
+        <p:txBody>
+          <a:bodyPr/>
+          <a:lstStyle/>
+          <a:p>
+            <a:fld id="{106E12CD-FCB1-464E-A775-0B83FDDACE03}" type="slidenum">
+              <a:rPr lang="en-US" smtClean="0"/>
+              <a:pPr/>
+              <a:t>6</a:t>
+            </a:fld>
+            <a:endParaRPr lang="en-US"/>
+          </a:p>
+        </p:txBody>
+      </p:sp>
+    </p:spTree>
+    <p:extLst>
+      <p:ext uri="{BB962C8B-B14F-4D97-AF65-F5344CB8AC3E}">
+        <p14:creationId xmlns:p14="http://schemas.microsoft.com/office/powerpoint/2010/main" val="2196988662"/>
+      </p:ext>
+    </p:extLst>
+  </p:cSld>
+  <p:clrMapOvr>
+    <a:masterClrMapping/>
+  </p:clrMapOvr>
+</p:sld>
+</file>
+
+<file path=ppt/slides/slide8.xml><?xml version="1.0" encoding="utf-8"?>
+<p:sld xmlns:a="http://schemas.openxmlformats.org/drawingml/2006/main" xmlns:r="http://schemas.openxmlformats.org/officeDocument/2006/relationships" xmlns:p="http://schemas.openxmlformats.org/presentationml/2006/main">
+  <p:cSld>
+    <p:spTree>
+      <p:nvGrpSpPr>
+        <p:cNvPr id="1" name=""/>
+        <p:cNvGrpSpPr/>
+        <p:nvPr/>
+      </p:nvGrpSpPr>
+      <p:grpSpPr>
+        <a:xfrm>
+          <a:off x="0" y="0"/>
+          <a:ext cx="0" cy="0"/>
+          <a:chOff x="0" y="0"/>
+          <a:chExt cx="0" cy="0"/>
+        </a:xfrm>
+      </p:grpSpPr>
+      <p:sp>
+        <p:nvSpPr>
+          <p:cNvPr id="2" name="Title 1">
+            <a:extLst>
+              <a:ext uri="{FF2B5EF4-FFF2-40B4-BE49-F238E27FC236}">
                 <a16:creationId xmlns:a16="http://schemas.microsoft.com/office/drawing/2014/main" id="{3093967D-F10A-4DC0-A77E-3AC06F09B4EE}"/>
               </a:ext>
             </a:extLst>
@@ -6043,7 +6250,7 @@
             <a:fld id="{106E12CD-FCB1-464E-A775-0B83FDDACE03}" type="slidenum">
               <a:rPr lang="en-US" smtClean="0"/>
               <a:pPr/>
-              <a:t>6</a:t>
+              <a:t>7</a:t>
             </a:fld>
             <a:endParaRPr lang="en-US"/>
           </a:p>
@@ -6182,7 +6389,7 @@
 </p:sld>
 </file>
 
-<file path=ppt/slides/slide8.xml><?xml version="1.0" encoding="utf-8"?>
+<file path=ppt/slides/slide9.xml><?xml version="1.0" encoding="utf-8"?>
 <p:sld xmlns:a="http://schemas.openxmlformats.org/drawingml/2006/main" xmlns:r="http://schemas.openxmlformats.org/officeDocument/2006/relationships" xmlns:p="http://schemas.openxmlformats.org/presentationml/2006/main">
   <p:cSld>
     <p:spTree>
@@ -6368,7 +6575,7 @@
             <a:fld id="{106E12CD-FCB1-464E-A775-0B83FDDACE03}" type="slidenum">
               <a:rPr lang="en-US" smtClean="0"/>
               <a:pPr/>
-              <a:t>7</a:t>
+              <a:t>8</a:t>
             </a:fld>
             <a:endParaRPr lang="en-US" dirty="0"/>
           </a:p>

</xml_diff>